<commit_message>
Added a .gitignore file
</commit_message>
<xml_diff>
--- a/GW2day-month-week.v2.pptx
+++ b/GW2day-month-week.v2.pptx
@@ -11,15 +11,15 @@
     <p:sldId id="256" r:id="rId2"/>
     <p:sldId id="267" r:id="rId3"/>
     <p:sldId id="266" r:id="rId4"/>
-    <p:sldId id="280" r:id="rId5"/>
-    <p:sldId id="274" r:id="rId6"/>
-    <p:sldId id="273" r:id="rId7"/>
-    <p:sldId id="275" r:id="rId8"/>
-    <p:sldId id="272" r:id="rId9"/>
-    <p:sldId id="276" r:id="rId10"/>
-    <p:sldId id="277" r:id="rId11"/>
-    <p:sldId id="278" r:id="rId12"/>
-    <p:sldId id="279" r:id="rId13"/>
+    <p:sldId id="276" r:id="rId5"/>
+    <p:sldId id="277" r:id="rId6"/>
+    <p:sldId id="278" r:id="rId7"/>
+    <p:sldId id="279" r:id="rId8"/>
+    <p:sldId id="280" r:id="rId9"/>
+    <p:sldId id="274" r:id="rId10"/>
+    <p:sldId id="273" r:id="rId11"/>
+    <p:sldId id="275" r:id="rId12"/>
+    <p:sldId id="272" r:id="rId13"/>
   </p:sldIdLst>
   <p:sldSz cx="12192000" cy="6858000"/>
   <p:notesSz cx="6858000" cy="9144000"/>
@@ -126,15 +126,15 @@
             <p14:sldId id="256"/>
             <p14:sldId id="267"/>
             <p14:sldId id="266"/>
+            <p14:sldId id="276"/>
+            <p14:sldId id="277"/>
+            <p14:sldId id="278"/>
+            <p14:sldId id="279"/>
             <p14:sldId id="280"/>
             <p14:sldId id="274"/>
             <p14:sldId id="273"/>
             <p14:sldId id="275"/>
             <p14:sldId id="272"/>
-            <p14:sldId id="276"/>
-            <p14:sldId id="277"/>
-            <p14:sldId id="278"/>
-            <p14:sldId id="279"/>
           </p14:sldIdLst>
         </p14:section>
       </p14:sectionLst>
@@ -228,7 +228,7 @@
           <a:p>
             <a:fld id="{B3F9201E-1C0E-8448-9954-B8CEF31D96C6}" type="datetimeFigureOut">
               <a:rPr lang="en-GB" smtClean="0"/>
-              <a:t>07/01/2019</a:t>
+              <a:t>08/01/2019</a:t>
             </a:fld>
             <a:endParaRPr lang="en-GB"/>
           </a:p>
@@ -832,7 +832,7 @@
           <a:p>
             <a:fld id="{3969D8E3-D3C3-7642-B20B-7C0235059422}" type="datetimeFigureOut">
               <a:rPr lang="en-GB" smtClean="0"/>
-              <a:t>07/01/2019</a:t>
+              <a:t>08/01/2019</a:t>
             </a:fld>
             <a:endParaRPr lang="en-GB"/>
           </a:p>
@@ -1032,7 +1032,7 @@
           <a:p>
             <a:fld id="{3969D8E3-D3C3-7642-B20B-7C0235059422}" type="datetimeFigureOut">
               <a:rPr lang="en-GB" smtClean="0"/>
-              <a:t>07/01/2019</a:t>
+              <a:t>08/01/2019</a:t>
             </a:fld>
             <a:endParaRPr lang="en-GB"/>
           </a:p>
@@ -1242,7 +1242,7 @@
           <a:p>
             <a:fld id="{3969D8E3-D3C3-7642-B20B-7C0235059422}" type="datetimeFigureOut">
               <a:rPr lang="en-GB" smtClean="0"/>
-              <a:t>07/01/2019</a:t>
+              <a:t>08/01/2019</a:t>
             </a:fld>
             <a:endParaRPr lang="en-GB"/>
           </a:p>
@@ -1442,7 +1442,7 @@
           <a:p>
             <a:fld id="{3969D8E3-D3C3-7642-B20B-7C0235059422}" type="datetimeFigureOut">
               <a:rPr lang="en-GB" smtClean="0"/>
-              <a:t>07/01/2019</a:t>
+              <a:t>08/01/2019</a:t>
             </a:fld>
             <a:endParaRPr lang="en-GB"/>
           </a:p>
@@ -1718,7 +1718,7 @@
           <a:p>
             <a:fld id="{3969D8E3-D3C3-7642-B20B-7C0235059422}" type="datetimeFigureOut">
               <a:rPr lang="en-GB" smtClean="0"/>
-              <a:t>07/01/2019</a:t>
+              <a:t>08/01/2019</a:t>
             </a:fld>
             <a:endParaRPr lang="en-GB"/>
           </a:p>
@@ -1986,7 +1986,7 @@
           <a:p>
             <a:fld id="{3969D8E3-D3C3-7642-B20B-7C0235059422}" type="datetimeFigureOut">
               <a:rPr lang="en-GB" smtClean="0"/>
-              <a:t>07/01/2019</a:t>
+              <a:t>08/01/2019</a:t>
             </a:fld>
             <a:endParaRPr lang="en-GB"/>
           </a:p>
@@ -2401,7 +2401,7 @@
           <a:p>
             <a:fld id="{3969D8E3-D3C3-7642-B20B-7C0235059422}" type="datetimeFigureOut">
               <a:rPr lang="en-GB" smtClean="0"/>
-              <a:t>07/01/2019</a:t>
+              <a:t>08/01/2019</a:t>
             </a:fld>
             <a:endParaRPr lang="en-GB"/>
           </a:p>
@@ -2543,7 +2543,7 @@
           <a:p>
             <a:fld id="{3969D8E3-D3C3-7642-B20B-7C0235059422}" type="datetimeFigureOut">
               <a:rPr lang="en-GB" smtClean="0"/>
-              <a:t>07/01/2019</a:t>
+              <a:t>08/01/2019</a:t>
             </a:fld>
             <a:endParaRPr lang="en-GB"/>
           </a:p>
@@ -2656,7 +2656,7 @@
           <a:p>
             <a:fld id="{3969D8E3-D3C3-7642-B20B-7C0235059422}" type="datetimeFigureOut">
               <a:rPr lang="en-GB" smtClean="0"/>
-              <a:t>07/01/2019</a:t>
+              <a:t>08/01/2019</a:t>
             </a:fld>
             <a:endParaRPr lang="en-GB"/>
           </a:p>
@@ -2969,7 +2969,7 @@
           <a:p>
             <a:fld id="{3969D8E3-D3C3-7642-B20B-7C0235059422}" type="datetimeFigureOut">
               <a:rPr lang="en-GB" smtClean="0"/>
-              <a:t>07/01/2019</a:t>
+              <a:t>08/01/2019</a:t>
             </a:fld>
             <a:endParaRPr lang="en-GB"/>
           </a:p>
@@ -3258,7 +3258,7 @@
           <a:p>
             <a:fld id="{3969D8E3-D3C3-7642-B20B-7C0235059422}" type="datetimeFigureOut">
               <a:rPr lang="en-GB" smtClean="0"/>
-              <a:t>07/01/2019</a:t>
+              <a:t>08/01/2019</a:t>
             </a:fld>
             <a:endParaRPr lang="en-GB"/>
           </a:p>
@@ -3501,7 +3501,7 @@
           <a:p>
             <a:fld id="{3969D8E3-D3C3-7642-B20B-7C0235059422}" type="datetimeFigureOut">
               <a:rPr lang="en-GB" smtClean="0"/>
-              <a:t>07/01/2019</a:t>
+              <a:t>08/01/2019</a:t>
             </a:fld>
             <a:endParaRPr lang="en-GB"/>
           </a:p>
@@ -4073,7 +4073,7 @@
       </p:grpSpPr>
       <p:cxnSp>
         <p:nvCxnSpPr>
-          <p:cNvPr id="27" name="Straight Connector 26">
+          <p:cNvPr id="15" name="Straight Connector 14">
             <a:extLst>
               <a:ext uri="{FF2B5EF4-FFF2-40B4-BE49-F238E27FC236}">
                 <a16:creationId xmlns:a16="http://schemas.microsoft.com/office/drawing/2014/main" id="{99AE2756-0FC4-4155-83E7-58AAAB63E757}"/>
@@ -4125,7 +4125,7 @@
       </p:cxnSp>
       <p:sp>
         <p:nvSpPr>
-          <p:cNvPr id="29" name="Rectangle 28">
+          <p:cNvPr id="17" name="Rectangle 16">
             <a:extLst>
               <a:ext uri="{FF2B5EF4-FFF2-40B4-BE49-F238E27FC236}">
                 <a16:creationId xmlns:a16="http://schemas.microsoft.com/office/drawing/2014/main" id="{247AB924-1B87-43FC-B7C7-B112D5C51A0E}"/>
@@ -4193,7 +4193,7 @@
           <p:cNvPr id="2" name="Title 1">
             <a:extLst>
               <a:ext uri="{FF2B5EF4-FFF2-40B4-BE49-F238E27FC236}">
-                <a16:creationId xmlns:a16="http://schemas.microsoft.com/office/drawing/2014/main" id="{9969B51F-E700-154C-B8FD-4C2BDBB43301}"/>
+                <a16:creationId xmlns:a16="http://schemas.microsoft.com/office/drawing/2014/main" id="{ADE24B77-24A9-D243-8982-2E341D94925B}"/>
               </a:ext>
             </a:extLst>
           </p:cNvPr>
@@ -4217,16 +4217,25 @@
           <a:lstStyle/>
           <a:p>
             <a:pPr algn="ctr"/>
-            <a:br>
-              <a:rPr lang="en-US" sz="3000">
+            <a:r>
+              <a:rPr lang="en-US" sz="5400" dirty="0">
                 <a:solidFill>
                   <a:srgbClr val="FFFFFF"/>
                 </a:solidFill>
               </a:rPr>
-            </a:br>
-            <a:endParaRPr lang="en-US" sz="3000">
+              <a:t>First - </a:t>
+            </a:r>
+            <a:r>
+              <a:rPr lang="en-GB" sz="5400" dirty="0">
+                <a:solidFill>
+                  <a:schemeClr val="bg1"/>
+                </a:solidFill>
+              </a:rPr>
+              <a:t>58a0cbeffe014e4c</a:t>
+            </a:r>
+            <a:endParaRPr lang="en-US" sz="5400" dirty="0">
               <a:solidFill>
-                <a:srgbClr val="FFFFFF"/>
+                <a:schemeClr val="bg1"/>
               </a:solidFill>
             </a:endParaRPr>
           </a:p>
@@ -4234,10 +4243,10 @@
       </p:sp>
       <p:pic>
         <p:nvPicPr>
-          <p:cNvPr id="20" name="Content Placeholder 19">
-            <a:extLst>
-              <a:ext uri="{FF2B5EF4-FFF2-40B4-BE49-F238E27FC236}">
-                <a16:creationId xmlns:a16="http://schemas.microsoft.com/office/drawing/2014/main" id="{439D91A7-AB42-ED42-A42D-FD8DFA2CE3DB}"/>
+          <p:cNvPr id="6" name="Content Placeholder 5">
+            <a:extLst>
+              <a:ext uri="{FF2B5EF4-FFF2-40B4-BE49-F238E27FC236}">
+                <a16:creationId xmlns:a16="http://schemas.microsoft.com/office/drawing/2014/main" id="{E295C166-EBE6-204E-82E0-0FB8D8D77A21}"/>
               </a:ext>
             </a:extLst>
           </p:cNvPr>
@@ -4245,7 +4254,7 @@
             <a:picLocks noGrp="1"/>
           </p:cNvPicPr>
           <p:nvPr>
-            <p:ph sz="half" idx="2"/>
+            <p:ph sz="half" idx="1"/>
           </p:nvPr>
         </p:nvPicPr>
         <p:blipFill>
@@ -4256,7 +4265,7 @@
         </p:blipFill>
         <p:spPr>
           <a:xfrm>
-            <a:off x="8074589" y="588429"/>
+            <a:off x="27090" y="712421"/>
             <a:ext cx="3967200" cy="3254400"/>
           </a:xfrm>
           <a:prstGeom prst="rect">
@@ -4266,17 +4275,19 @@
       </p:pic>
       <p:pic>
         <p:nvPicPr>
-          <p:cNvPr id="22" name="Picture 21">
-            <a:extLst>
-              <a:ext uri="{FF2B5EF4-FFF2-40B4-BE49-F238E27FC236}">
-                <a16:creationId xmlns:a16="http://schemas.microsoft.com/office/drawing/2014/main" id="{577F387A-03E5-134E-B4B3-2E73519F36A1}"/>
+          <p:cNvPr id="8" name="Content Placeholder 7">
+            <a:extLst>
+              <a:ext uri="{FF2B5EF4-FFF2-40B4-BE49-F238E27FC236}">
+                <a16:creationId xmlns:a16="http://schemas.microsoft.com/office/drawing/2014/main" id="{35AFC2B9-F0A5-FF4F-8B81-E604C1E6C85B}"/>
               </a:ext>
             </a:extLst>
           </p:cNvPr>
           <p:cNvPicPr>
-            <a:picLocks/>
+            <a:picLocks noGrp="1"/>
           </p:cNvPicPr>
-          <p:nvPr/>
+          <p:nvPr>
+            <p:ph sz="half" idx="2"/>
+          </p:nvPr>
         </p:nvPicPr>
         <p:blipFill>
           <a:blip r:embed="rId3"/>
@@ -4286,7 +4297,7 @@
         </p:blipFill>
         <p:spPr>
           <a:xfrm>
-            <a:off x="4159111" y="588429"/>
+            <a:off x="8126312" y="712421"/>
             <a:ext cx="3967200" cy="3254400"/>
           </a:xfrm>
           <a:prstGeom prst="rect">
@@ -4296,7 +4307,7 @@
       </p:pic>
       <p:cxnSp>
         <p:nvCxnSpPr>
-          <p:cNvPr id="31" name="Straight Connector 30">
+          <p:cNvPr id="19" name="Straight Connector 18">
             <a:extLst>
               <a:ext uri="{FF2B5EF4-FFF2-40B4-BE49-F238E27FC236}">
                 <a16:creationId xmlns:a16="http://schemas.microsoft.com/office/drawing/2014/main" id="{818DC98F-4057-4645-B948-F604F39A9CFE}"/>
@@ -4348,19 +4359,17 @@
       </p:cxnSp>
       <p:pic>
         <p:nvPicPr>
-          <p:cNvPr id="18" name="Content Placeholder 17">
-            <a:extLst>
-              <a:ext uri="{FF2B5EF4-FFF2-40B4-BE49-F238E27FC236}">
-                <a16:creationId xmlns:a16="http://schemas.microsoft.com/office/drawing/2014/main" id="{517842DE-842C-0C4E-8506-9AE9E9D4CFBC}"/>
+          <p:cNvPr id="10" name="Picture 9">
+            <a:extLst>
+              <a:ext uri="{FF2B5EF4-FFF2-40B4-BE49-F238E27FC236}">
+                <a16:creationId xmlns:a16="http://schemas.microsoft.com/office/drawing/2014/main" id="{33700852-12E6-964C-9EC8-FF9AC580A367}"/>
               </a:ext>
             </a:extLst>
           </p:cNvPr>
           <p:cNvPicPr>
-            <a:picLocks noGrp="1"/>
+            <a:picLocks/>
           </p:cNvPicPr>
-          <p:nvPr>
-            <p:ph sz="half" idx="1"/>
-          </p:nvPr>
+          <p:nvPr/>
         </p:nvPicPr>
         <p:blipFill>
           <a:blip r:embed="rId4"/>
@@ -4370,7 +4379,7 @@
         </p:blipFill>
         <p:spPr>
           <a:xfrm>
-            <a:off x="-22021" y="588429"/>
+            <a:off x="4112400" y="712421"/>
             <a:ext cx="3967200" cy="3254400"/>
           </a:xfrm>
           <a:prstGeom prst="rect">
@@ -4380,7 +4389,7 @@
       </p:pic>
       <p:cxnSp>
         <p:nvCxnSpPr>
-          <p:cNvPr id="33" name="Straight Connector 32">
+          <p:cNvPr id="21" name="Straight Connector 20">
             <a:extLst>
               <a:ext uri="{FF2B5EF4-FFF2-40B4-BE49-F238E27FC236}">
                 <a16:creationId xmlns:a16="http://schemas.microsoft.com/office/drawing/2014/main" id="{DAD2B705-4A9B-408D-AA80-4F41045E09DE}"/>
@@ -4430,50 +4439,10 @@
           </a:fontRef>
         </p:style>
       </p:cxnSp>
-      <p:sp>
-        <p:nvSpPr>
-          <p:cNvPr id="23" name="TextBox 22">
-            <a:extLst>
-              <a:ext uri="{FF2B5EF4-FFF2-40B4-BE49-F238E27FC236}">
-                <a16:creationId xmlns:a16="http://schemas.microsoft.com/office/drawing/2014/main" id="{DBCB96FA-AC8D-694C-B387-E40AA47865F5}"/>
-              </a:ext>
-            </a:extLst>
-          </p:cNvPr>
-          <p:cNvSpPr txBox="1"/>
-          <p:nvPr/>
-        </p:nvSpPr>
-        <p:spPr>
-          <a:xfrm>
-            <a:off x="2629474" y="4886847"/>
-            <a:ext cx="7026475" cy="923330"/>
-          </a:xfrm>
-          <a:prstGeom prst="rect">
-            <a:avLst/>
-          </a:prstGeom>
-          <a:noFill/>
-        </p:spPr>
-        <p:txBody>
-          <a:bodyPr wrap="none" rtlCol="0">
-            <a:spAutoFit/>
-          </a:bodyPr>
-          <a:lstStyle/>
-          <a:p>
-            <a:r>
-              <a:rPr lang="en-GB" sz="5400" dirty="0">
-                <a:solidFill>
-                  <a:schemeClr val="bg1"/>
-                </a:solidFill>
-                <a:latin typeface="+mj-lt"/>
-              </a:rPr>
-              <a:t>First - 58a0cbeffe014e4c</a:t>
-            </a:r>
-          </a:p>
-        </p:txBody>
-      </p:sp>
     </p:spTree>
     <p:extLst>
       <p:ext uri="{BB962C8B-B14F-4D97-AF65-F5344CB8AC3E}">
-        <p14:creationId xmlns:p14="http://schemas.microsoft.com/office/powerpoint/2010/main" val="324306549"/>
+        <p14:creationId xmlns:p14="http://schemas.microsoft.com/office/powerpoint/2010/main" val="2107334995"/>
       </p:ext>
     </p:extLst>
   </p:cSld>
@@ -4630,7 +4599,7 @@
           <p:cNvPr id="2" name="Title 1">
             <a:extLst>
               <a:ext uri="{FF2B5EF4-FFF2-40B4-BE49-F238E27FC236}">
-                <a16:creationId xmlns:a16="http://schemas.microsoft.com/office/drawing/2014/main" id="{C92C0240-1B90-C247-AAD9-79F8399F9CCF}"/>
+                <a16:creationId xmlns:a16="http://schemas.microsoft.com/office/drawing/2014/main" id="{9D5C906E-556D-A344-A0E9-A3B96E23ACC8}"/>
               </a:ext>
             </a:extLst>
           </p:cNvPr>
@@ -4672,7 +4641,7 @@
             </a:r>
             <a:endParaRPr lang="en-US" sz="5400" dirty="0">
               <a:solidFill>
-                <a:srgbClr val="FFFFFF"/>
+                <a:schemeClr val="bg1"/>
               </a:solidFill>
             </a:endParaRPr>
           </a:p>
@@ -4680,19 +4649,17 @@
       </p:sp>
       <p:pic>
         <p:nvPicPr>
-          <p:cNvPr id="6" name="Content Placeholder 5">
-            <a:extLst>
-              <a:ext uri="{FF2B5EF4-FFF2-40B4-BE49-F238E27FC236}">
-                <a16:creationId xmlns:a16="http://schemas.microsoft.com/office/drawing/2014/main" id="{843B6AA6-3065-E24B-80B2-AFB55B737C39}"/>
+          <p:cNvPr id="10" name="Picture 9">
+            <a:extLst>
+              <a:ext uri="{FF2B5EF4-FFF2-40B4-BE49-F238E27FC236}">
+                <a16:creationId xmlns:a16="http://schemas.microsoft.com/office/drawing/2014/main" id="{9CF56AA6-42E2-694D-BDF2-01BE30F8BCAD}"/>
               </a:ext>
             </a:extLst>
           </p:cNvPr>
           <p:cNvPicPr>
-            <a:picLocks noGrp="1"/>
+            <a:picLocks/>
           </p:cNvPicPr>
-          <p:nvPr>
-            <p:ph sz="half" idx="1"/>
-          </p:nvPr>
+          <p:nvPr/>
         </p:nvPicPr>
         <p:blipFill>
           <a:blip r:embed="rId2"/>
@@ -4702,7 +4669,7 @@
         </p:blipFill>
         <p:spPr>
           <a:xfrm>
-            <a:off x="16620" y="711521"/>
+            <a:off x="4112400" y="679349"/>
             <a:ext cx="3967200" cy="3254400"/>
           </a:xfrm>
           <a:prstGeom prst="rect">
@@ -4712,17 +4679,19 @@
       </p:pic>
       <p:pic>
         <p:nvPicPr>
-          <p:cNvPr id="10" name="Picture 9">
-            <a:extLst>
-              <a:ext uri="{FF2B5EF4-FFF2-40B4-BE49-F238E27FC236}">
-                <a16:creationId xmlns:a16="http://schemas.microsoft.com/office/drawing/2014/main" id="{EC5BF242-87B9-7540-852C-57E0EDC712A3}"/>
+          <p:cNvPr id="6" name="Content Placeholder 5">
+            <a:extLst>
+              <a:ext uri="{FF2B5EF4-FFF2-40B4-BE49-F238E27FC236}">
+                <a16:creationId xmlns:a16="http://schemas.microsoft.com/office/drawing/2014/main" id="{56D6F0B1-1F52-EC46-8646-5C0289770B4C}"/>
               </a:ext>
             </a:extLst>
           </p:cNvPr>
           <p:cNvPicPr>
-            <a:picLocks/>
+            <a:picLocks noGrp="1"/>
           </p:cNvPicPr>
-          <p:nvPr/>
+          <p:nvPr>
+            <p:ph sz="half" idx="1"/>
+          </p:nvPr>
         </p:nvPicPr>
         <p:blipFill>
           <a:blip r:embed="rId3"/>
@@ -4732,7 +4701,7 @@
         </p:blipFill>
         <p:spPr>
           <a:xfrm>
-            <a:off x="4186200" y="711521"/>
+            <a:off x="0" y="679349"/>
             <a:ext cx="3967200" cy="3254400"/>
           </a:xfrm>
           <a:prstGeom prst="rect">
@@ -4797,7 +4766,7 @@
           <p:cNvPr id="8" name="Content Placeholder 7">
             <a:extLst>
               <a:ext uri="{FF2B5EF4-FFF2-40B4-BE49-F238E27FC236}">
-                <a16:creationId xmlns:a16="http://schemas.microsoft.com/office/drawing/2014/main" id="{4697CADC-9F9E-334E-9D5D-CF86649328E4}"/>
+                <a16:creationId xmlns:a16="http://schemas.microsoft.com/office/drawing/2014/main" id="{94BB61BB-C6BF-FE43-BB8C-A35FF2DE2ED7}"/>
               </a:ext>
             </a:extLst>
           </p:cNvPr>
@@ -4816,7 +4785,7 @@
         </p:blipFill>
         <p:spPr>
           <a:xfrm>
-            <a:off x="8273910" y="711521"/>
+            <a:off x="8224800" y="679349"/>
             <a:ext cx="3967200" cy="3254400"/>
           </a:xfrm>
           <a:prstGeom prst="rect">
@@ -4879,7 +4848,7 @@
     </p:spTree>
     <p:extLst>
       <p:ext uri="{BB962C8B-B14F-4D97-AF65-F5344CB8AC3E}">
-        <p14:creationId xmlns:p14="http://schemas.microsoft.com/office/powerpoint/2010/main" val="2150736919"/>
+        <p14:creationId xmlns:p14="http://schemas.microsoft.com/office/powerpoint/2010/main" val="3592700593"/>
       </p:ext>
     </p:extLst>
   </p:cSld>
@@ -5036,7 +5005,7 @@
           <p:cNvPr id="2" name="Title 1">
             <a:extLst>
               <a:ext uri="{FF2B5EF4-FFF2-40B4-BE49-F238E27FC236}">
-                <a16:creationId xmlns:a16="http://schemas.microsoft.com/office/drawing/2014/main" id="{20FE96D7-A45D-9F4E-AA21-59DB87CDD280}"/>
+                <a16:creationId xmlns:a16="http://schemas.microsoft.com/office/drawing/2014/main" id="{3EFE1A34-7DA6-1E4D-9562-1345FD695C00}"/>
               </a:ext>
             </a:extLst>
           </p:cNvPr>
@@ -5076,30 +5045,29 @@
               </a:rPr>
               <a:t>1c497beffecab36d</a:t>
             </a:r>
-            <a:r>
-              <a:rPr lang="en-US" sz="5400" dirty="0">
-                <a:solidFill>
-                  <a:srgbClr val="FFFFFF"/>
-                </a:solidFill>
-              </a:rPr>
-              <a:t> </a:t>
-            </a:r>
+            <a:endParaRPr lang="en-US" sz="5400" dirty="0">
+              <a:solidFill>
+                <a:schemeClr val="bg1"/>
+              </a:solidFill>
+            </a:endParaRPr>
           </a:p>
         </p:txBody>
       </p:sp>
       <p:pic>
         <p:nvPicPr>
-          <p:cNvPr id="10" name="Picture 9">
-            <a:extLst>
-              <a:ext uri="{FF2B5EF4-FFF2-40B4-BE49-F238E27FC236}">
-                <a16:creationId xmlns:a16="http://schemas.microsoft.com/office/drawing/2014/main" id="{C36CABB9-CD2C-E244-98FD-846934F6C0B2}"/>
+          <p:cNvPr id="6" name="Content Placeholder 5">
+            <a:extLst>
+              <a:ext uri="{FF2B5EF4-FFF2-40B4-BE49-F238E27FC236}">
+                <a16:creationId xmlns:a16="http://schemas.microsoft.com/office/drawing/2014/main" id="{E8BBE290-9EE2-4145-88DE-C67E1172D81F}"/>
               </a:ext>
             </a:extLst>
           </p:cNvPr>
           <p:cNvPicPr>
-            <a:picLocks/>
+            <a:picLocks noGrp="1" noChangeAspect="1"/>
           </p:cNvPicPr>
-          <p:nvPr/>
+          <p:nvPr>
+            <p:ph sz="half" idx="1"/>
+          </p:nvPr>
         </p:nvPicPr>
         <p:blipFill>
           <a:blip r:embed="rId2"/>
@@ -5109,8 +5077,8 @@
         </p:blipFill>
         <p:spPr>
           <a:xfrm>
-            <a:off x="4125945" y="640036"/>
-            <a:ext cx="3967200" cy="3254400"/>
+            <a:off x="0" y="638827"/>
+            <a:ext cx="3965340" cy="3255608"/>
           </a:xfrm>
           <a:prstGeom prst="rect">
             <a:avLst/>
@@ -5119,19 +5087,17 @@
       </p:pic>
       <p:pic>
         <p:nvPicPr>
-          <p:cNvPr id="8" name="Content Placeholder 7">
-            <a:extLst>
-              <a:ext uri="{FF2B5EF4-FFF2-40B4-BE49-F238E27FC236}">
-                <a16:creationId xmlns:a16="http://schemas.microsoft.com/office/drawing/2014/main" id="{AF6CDFC5-F3F3-4444-BFBF-AA78496EF39B}"/>
+          <p:cNvPr id="10" name="Picture 9">
+            <a:extLst>
+              <a:ext uri="{FF2B5EF4-FFF2-40B4-BE49-F238E27FC236}">
+                <a16:creationId xmlns:a16="http://schemas.microsoft.com/office/drawing/2014/main" id="{D249B997-3AEA-804E-9D50-83FC47B7F3FD}"/>
               </a:ext>
             </a:extLst>
           </p:cNvPr>
           <p:cNvPicPr>
-            <a:picLocks noGrp="1"/>
+            <a:picLocks noChangeAspect="1"/>
           </p:cNvPicPr>
-          <p:nvPr>
-            <p:ph sz="half" idx="2"/>
-          </p:nvPr>
+          <p:nvPr/>
         </p:nvPicPr>
         <p:blipFill>
           <a:blip r:embed="rId3"/>
@@ -5141,8 +5107,8 @@
         </p:blipFill>
         <p:spPr>
           <a:xfrm>
-            <a:off x="8126312" y="640036"/>
-            <a:ext cx="3967200" cy="3254400"/>
+            <a:off x="4112400" y="638827"/>
+            <a:ext cx="3967200" cy="3255608"/>
           </a:xfrm>
           <a:prstGeom prst="rect">
             <a:avLst/>
@@ -5203,18 +5169,18 @@
       </p:cxnSp>
       <p:pic>
         <p:nvPicPr>
-          <p:cNvPr id="6" name="Content Placeholder 5">
-            <a:extLst>
-              <a:ext uri="{FF2B5EF4-FFF2-40B4-BE49-F238E27FC236}">
-                <a16:creationId xmlns:a16="http://schemas.microsoft.com/office/drawing/2014/main" id="{00FF11AF-7578-5943-A0C4-DD8EED19E0E2}"/>
+          <p:cNvPr id="8" name="Content Placeholder 7">
+            <a:extLst>
+              <a:ext uri="{FF2B5EF4-FFF2-40B4-BE49-F238E27FC236}">
+                <a16:creationId xmlns:a16="http://schemas.microsoft.com/office/drawing/2014/main" id="{D9C8548B-1D71-1147-9379-FF4F6C2F10B4}"/>
               </a:ext>
             </a:extLst>
           </p:cNvPr>
           <p:cNvPicPr>
-            <a:picLocks noGrp="1"/>
+            <a:picLocks noGrp="1" noChangeAspect="1"/>
           </p:cNvPicPr>
           <p:nvPr>
-            <p:ph sz="half" idx="1"/>
+            <p:ph sz="half" idx="2"/>
           </p:nvPr>
         </p:nvPicPr>
         <p:blipFill>
@@ -5225,8 +5191,8 @@
         </p:blipFill>
         <p:spPr>
           <a:xfrm>
-            <a:off x="-22021" y="640036"/>
-            <a:ext cx="3967200" cy="3254400"/>
+            <a:off x="8227201" y="639230"/>
+            <a:ext cx="3964801" cy="3255205"/>
           </a:xfrm>
           <a:prstGeom prst="rect">
             <a:avLst/>
@@ -5288,7 +5254,7 @@
     </p:spTree>
     <p:extLst>
       <p:ext uri="{BB962C8B-B14F-4D97-AF65-F5344CB8AC3E}">
-        <p14:creationId xmlns:p14="http://schemas.microsoft.com/office/powerpoint/2010/main" val="2897721853"/>
+        <p14:creationId xmlns:p14="http://schemas.microsoft.com/office/powerpoint/2010/main" val="2977146383"/>
       </p:ext>
     </p:extLst>
   </p:cSld>
@@ -5637,7 +5603,7 @@
           <a:p>
             <a:r>
               <a:rPr lang="en-GB" dirty="0"/>
-              <a:t>Pre-deduplication device packets</a:t>
+              <a:t>Deduplication device packets</a:t>
             </a:r>
           </a:p>
         </p:txBody>
@@ -5661,21 +5627,14 @@
         <p:spPr/>
         <p:txBody>
           <a:bodyPr>
-            <a:normAutofit lnSpcReduction="10000"/>
+            <a:normAutofit/>
           </a:bodyPr>
           <a:lstStyle/>
           <a:p>
             <a:pPr lvl="1" algn="l"/>
             <a:r>
               <a:rPr lang="en-GB" dirty="0"/>
-              <a:t>4 Gateways: </a:t>
-            </a:r>
-          </a:p>
-          <a:p>
-            <a:pPr lvl="1" algn="l"/>
-            <a:r>
-              <a:rPr lang="en-GB" dirty="0"/>
-              <a:t>Terni 	 	MAC: 70b3d54b13020000</a:t>
+              <a:t>3 Gateways: </a:t>
             </a:r>
           </a:p>
           <a:p>
@@ -5698,13 +5657,20 @@
               <a:rPr lang="en-GB" dirty="0"/>
               <a:t>Third 		MAC: 1c497beffecab36d</a:t>
             </a:r>
+          </a:p>
+          <a:p>
+            <a:pPr algn="l"/>
+            <a:endParaRPr lang="en-GB" dirty="0"/>
+          </a:p>
+          <a:p>
+            <a:endParaRPr lang="en-GB" dirty="0"/>
           </a:p>
         </p:txBody>
       </p:sp>
     </p:spTree>
     <p:extLst>
       <p:ext uri="{BB962C8B-B14F-4D97-AF65-F5344CB8AC3E}">
-        <p14:creationId xmlns:p14="http://schemas.microsoft.com/office/powerpoint/2010/main" val="2486473387"/>
+        <p14:creationId xmlns:p14="http://schemas.microsoft.com/office/powerpoint/2010/main" val="2137356216"/>
       </p:ext>
     </p:extLst>
   </p:cSld>
@@ -5741,7 +5707,7 @@
       </p:grpSpPr>
       <p:cxnSp>
         <p:nvCxnSpPr>
-          <p:cNvPr id="15" name="Straight Connector 14">
+          <p:cNvPr id="27" name="Straight Connector 26">
             <a:extLst>
               <a:ext uri="{FF2B5EF4-FFF2-40B4-BE49-F238E27FC236}">
                 <a16:creationId xmlns:a16="http://schemas.microsoft.com/office/drawing/2014/main" id="{99AE2756-0FC4-4155-83E7-58AAAB63E757}"/>
@@ -5793,7 +5759,7 @@
       </p:cxnSp>
       <p:sp>
         <p:nvSpPr>
-          <p:cNvPr id="17" name="Rectangle 16">
+          <p:cNvPr id="29" name="Rectangle 28">
             <a:extLst>
               <a:ext uri="{FF2B5EF4-FFF2-40B4-BE49-F238E27FC236}">
                 <a16:creationId xmlns:a16="http://schemas.microsoft.com/office/drawing/2014/main" id="{247AB924-1B87-43FC-B7C7-B112D5C51A0E}"/>
@@ -5861,7 +5827,7 @@
           <p:cNvPr id="2" name="Title 1">
             <a:extLst>
               <a:ext uri="{FF2B5EF4-FFF2-40B4-BE49-F238E27FC236}">
-                <a16:creationId xmlns:a16="http://schemas.microsoft.com/office/drawing/2014/main" id="{EA70FF6C-8554-7D45-A218-F7F891B7BCC0}"/>
+                <a16:creationId xmlns:a16="http://schemas.microsoft.com/office/drawing/2014/main" id="{9969B51F-E700-154C-B8FD-4C2BDBB43301}"/>
               </a:ext>
             </a:extLst>
           </p:cNvPr>
@@ -5885,46 +5851,36 @@
           <a:lstStyle/>
           <a:p>
             <a:pPr algn="ctr"/>
-            <a:r>
-              <a:rPr lang="en-US" sz="5400" dirty="0">
+            <a:br>
+              <a:rPr lang="en-US" sz="3000">
                 <a:solidFill>
                   <a:srgbClr val="FFFFFF"/>
                 </a:solidFill>
               </a:rPr>
-              <a:t>Terni - </a:t>
-            </a:r>
-            <a:r>
-              <a:rPr lang="en-GB" sz="5400" dirty="0">
-                <a:solidFill>
-                  <a:schemeClr val="bg1"/>
-                </a:solidFill>
-              </a:rPr>
-              <a:t>70b3d54b13020000</a:t>
-            </a:r>
-            <a:r>
-              <a:rPr lang="en-US" sz="5400" dirty="0">
-                <a:solidFill>
-                  <a:srgbClr val="FFFFFF"/>
-                </a:solidFill>
-              </a:rPr>
-              <a:t> </a:t>
-            </a:r>
+            </a:br>
+            <a:endParaRPr lang="en-US" sz="3000">
+              <a:solidFill>
+                <a:srgbClr val="FFFFFF"/>
+              </a:solidFill>
+            </a:endParaRPr>
           </a:p>
         </p:txBody>
       </p:sp>
       <p:pic>
         <p:nvPicPr>
-          <p:cNvPr id="10" name="Picture 9">
-            <a:extLst>
-              <a:ext uri="{FF2B5EF4-FFF2-40B4-BE49-F238E27FC236}">
-                <a16:creationId xmlns:a16="http://schemas.microsoft.com/office/drawing/2014/main" id="{69029E7B-4755-374D-83B8-BCE635536041}"/>
+          <p:cNvPr id="20" name="Content Placeholder 19">
+            <a:extLst>
+              <a:ext uri="{FF2B5EF4-FFF2-40B4-BE49-F238E27FC236}">
+                <a16:creationId xmlns:a16="http://schemas.microsoft.com/office/drawing/2014/main" id="{439D91A7-AB42-ED42-A42D-FD8DFA2CE3DB}"/>
               </a:ext>
             </a:extLst>
           </p:cNvPr>
           <p:cNvPicPr>
-            <a:picLocks/>
+            <a:picLocks noGrp="1"/>
           </p:cNvPicPr>
-          <p:nvPr/>
+          <p:nvPr>
+            <p:ph sz="half" idx="2"/>
+          </p:nvPr>
         </p:nvPicPr>
         <p:blipFill>
           <a:blip r:embed="rId2"/>
@@ -5934,7 +5890,7 @@
         </p:blipFill>
         <p:spPr>
           <a:xfrm>
-            <a:off x="4186200" y="597254"/>
+            <a:off x="8074589" y="588429"/>
             <a:ext cx="3967200" cy="3254400"/>
           </a:xfrm>
           <a:prstGeom prst="rect">
@@ -5944,19 +5900,17 @@
       </p:pic>
       <p:pic>
         <p:nvPicPr>
-          <p:cNvPr id="8" name="Content Placeholder 7">
-            <a:extLst>
-              <a:ext uri="{FF2B5EF4-FFF2-40B4-BE49-F238E27FC236}">
-                <a16:creationId xmlns:a16="http://schemas.microsoft.com/office/drawing/2014/main" id="{B3B4023A-C3DF-3248-AA8A-5684E2033707}"/>
+          <p:cNvPr id="22" name="Picture 21">
+            <a:extLst>
+              <a:ext uri="{FF2B5EF4-FFF2-40B4-BE49-F238E27FC236}">
+                <a16:creationId xmlns:a16="http://schemas.microsoft.com/office/drawing/2014/main" id="{577F387A-03E5-134E-B4B3-2E73519F36A1}"/>
               </a:ext>
             </a:extLst>
           </p:cNvPr>
           <p:cNvPicPr>
-            <a:picLocks noGrp="1"/>
+            <a:picLocks/>
           </p:cNvPicPr>
-          <p:nvPr>
-            <p:ph sz="half" idx="2"/>
-          </p:nvPr>
+          <p:nvPr/>
         </p:nvPicPr>
         <p:blipFill>
           <a:blip r:embed="rId3"/>
@@ -5966,7 +5920,7 @@
         </p:blipFill>
         <p:spPr>
           <a:xfrm>
-            <a:off x="8126312" y="597254"/>
+            <a:off x="4159111" y="588429"/>
             <a:ext cx="3967200" cy="3254400"/>
           </a:xfrm>
           <a:prstGeom prst="rect">
@@ -5976,7 +5930,7 @@
       </p:pic>
       <p:cxnSp>
         <p:nvCxnSpPr>
-          <p:cNvPr id="19" name="Straight Connector 18">
+          <p:cNvPr id="31" name="Straight Connector 30">
             <a:extLst>
               <a:ext uri="{FF2B5EF4-FFF2-40B4-BE49-F238E27FC236}">
                 <a16:creationId xmlns:a16="http://schemas.microsoft.com/office/drawing/2014/main" id="{818DC98F-4057-4645-B948-F604F39A9CFE}"/>
@@ -6028,10 +5982,10 @@
       </p:cxnSp>
       <p:pic>
         <p:nvPicPr>
-          <p:cNvPr id="6" name="Content Placeholder 5">
-            <a:extLst>
-              <a:ext uri="{FF2B5EF4-FFF2-40B4-BE49-F238E27FC236}">
-                <a16:creationId xmlns:a16="http://schemas.microsoft.com/office/drawing/2014/main" id="{1F85DC14-935C-F84D-882A-E39CDFF634A2}"/>
+          <p:cNvPr id="18" name="Content Placeholder 17">
+            <a:extLst>
+              <a:ext uri="{FF2B5EF4-FFF2-40B4-BE49-F238E27FC236}">
+                <a16:creationId xmlns:a16="http://schemas.microsoft.com/office/drawing/2014/main" id="{517842DE-842C-0C4E-8506-9AE9E9D4CFBC}"/>
               </a:ext>
             </a:extLst>
           </p:cNvPr>
@@ -6050,7 +6004,7 @@
         </p:blipFill>
         <p:spPr>
           <a:xfrm>
-            <a:off x="38234" y="597703"/>
+            <a:off x="-22021" y="588429"/>
             <a:ext cx="3967200" cy="3254400"/>
           </a:xfrm>
           <a:prstGeom prst="rect">
@@ -6060,7 +6014,7 @@
       </p:pic>
       <p:cxnSp>
         <p:nvCxnSpPr>
-          <p:cNvPr id="21" name="Straight Connector 20">
+          <p:cNvPr id="33" name="Straight Connector 32">
             <a:extLst>
               <a:ext uri="{FF2B5EF4-FFF2-40B4-BE49-F238E27FC236}">
                 <a16:creationId xmlns:a16="http://schemas.microsoft.com/office/drawing/2014/main" id="{DAD2B705-4A9B-408D-AA80-4F41045E09DE}"/>
@@ -6110,10 +6064,50 @@
           </a:fontRef>
         </p:style>
       </p:cxnSp>
+      <p:sp>
+        <p:nvSpPr>
+          <p:cNvPr id="23" name="TextBox 22">
+            <a:extLst>
+              <a:ext uri="{FF2B5EF4-FFF2-40B4-BE49-F238E27FC236}">
+                <a16:creationId xmlns:a16="http://schemas.microsoft.com/office/drawing/2014/main" id="{DBCB96FA-AC8D-694C-B387-E40AA47865F5}"/>
+              </a:ext>
+            </a:extLst>
+          </p:cNvPr>
+          <p:cNvSpPr txBox="1"/>
+          <p:nvPr/>
+        </p:nvSpPr>
+        <p:spPr>
+          <a:xfrm>
+            <a:off x="2629474" y="4886847"/>
+            <a:ext cx="7026475" cy="923330"/>
+          </a:xfrm>
+          <a:prstGeom prst="rect">
+            <a:avLst/>
+          </a:prstGeom>
+          <a:noFill/>
+        </p:spPr>
+        <p:txBody>
+          <a:bodyPr wrap="none" rtlCol="0">
+            <a:spAutoFit/>
+          </a:bodyPr>
+          <a:lstStyle/>
+          <a:p>
+            <a:r>
+              <a:rPr lang="en-GB" sz="5400" dirty="0">
+                <a:solidFill>
+                  <a:schemeClr val="bg1"/>
+                </a:solidFill>
+                <a:latin typeface="+mj-lt"/>
+              </a:rPr>
+              <a:t>First - 58a0cbeffe014e4c</a:t>
+            </a:r>
+          </a:p>
+        </p:txBody>
+      </p:sp>
     </p:spTree>
     <p:extLst>
       <p:ext uri="{BB962C8B-B14F-4D97-AF65-F5344CB8AC3E}">
-        <p14:creationId xmlns:p14="http://schemas.microsoft.com/office/powerpoint/2010/main" val="2673612195"/>
+        <p14:creationId xmlns:p14="http://schemas.microsoft.com/office/powerpoint/2010/main" val="324306549"/>
       </p:ext>
     </p:extLst>
   </p:cSld>
@@ -6270,7 +6264,7 @@
           <p:cNvPr id="2" name="Title 1">
             <a:extLst>
               <a:ext uri="{FF2B5EF4-FFF2-40B4-BE49-F238E27FC236}">
-                <a16:creationId xmlns:a16="http://schemas.microsoft.com/office/drawing/2014/main" id="{ADE24B77-24A9-D243-8982-2E341D94925B}"/>
+                <a16:creationId xmlns:a16="http://schemas.microsoft.com/office/drawing/2014/main" id="{C92C0240-1B90-C247-AAD9-79F8399F9CCF}"/>
               </a:ext>
             </a:extLst>
           </p:cNvPr>
@@ -6300,7 +6294,7 @@
                   <a:srgbClr val="FFFFFF"/>
                 </a:solidFill>
               </a:rPr>
-              <a:t>First - </a:t>
+              <a:t>Second - </a:t>
             </a:r>
             <a:r>
               <a:rPr lang="en-GB" sz="5400" dirty="0">
@@ -6308,11 +6302,11 @@
                   <a:schemeClr val="bg1"/>
                 </a:solidFill>
               </a:rPr>
-              <a:t>58a0cbeffe014e4c</a:t>
+              <a:t>7276ff002e0503c8</a:t>
             </a:r>
             <a:endParaRPr lang="en-US" sz="5400" dirty="0">
               <a:solidFill>
-                <a:schemeClr val="bg1"/>
+                <a:srgbClr val="FFFFFF"/>
               </a:solidFill>
             </a:endParaRPr>
           </a:p>
@@ -6323,7 +6317,7 @@
           <p:cNvPr id="6" name="Content Placeholder 5">
             <a:extLst>
               <a:ext uri="{FF2B5EF4-FFF2-40B4-BE49-F238E27FC236}">
-                <a16:creationId xmlns:a16="http://schemas.microsoft.com/office/drawing/2014/main" id="{E295C166-EBE6-204E-82E0-0FB8D8D77A21}"/>
+                <a16:creationId xmlns:a16="http://schemas.microsoft.com/office/drawing/2014/main" id="{843B6AA6-3065-E24B-80B2-AFB55B737C39}"/>
               </a:ext>
             </a:extLst>
           </p:cNvPr>
@@ -6342,7 +6336,7 @@
         </p:blipFill>
         <p:spPr>
           <a:xfrm>
-            <a:off x="27090" y="712421"/>
+            <a:off x="16620" y="711521"/>
             <a:ext cx="3967200" cy="3254400"/>
           </a:xfrm>
           <a:prstGeom prst="rect">
@@ -6352,19 +6346,17 @@
       </p:pic>
       <p:pic>
         <p:nvPicPr>
-          <p:cNvPr id="8" name="Content Placeholder 7">
-            <a:extLst>
-              <a:ext uri="{FF2B5EF4-FFF2-40B4-BE49-F238E27FC236}">
-                <a16:creationId xmlns:a16="http://schemas.microsoft.com/office/drawing/2014/main" id="{35AFC2B9-F0A5-FF4F-8B81-E604C1E6C85B}"/>
+          <p:cNvPr id="10" name="Picture 9">
+            <a:extLst>
+              <a:ext uri="{FF2B5EF4-FFF2-40B4-BE49-F238E27FC236}">
+                <a16:creationId xmlns:a16="http://schemas.microsoft.com/office/drawing/2014/main" id="{EC5BF242-87B9-7540-852C-57E0EDC712A3}"/>
               </a:ext>
             </a:extLst>
           </p:cNvPr>
           <p:cNvPicPr>
-            <a:picLocks noGrp="1"/>
+            <a:picLocks/>
           </p:cNvPicPr>
-          <p:nvPr>
-            <p:ph sz="half" idx="2"/>
-          </p:nvPr>
+          <p:nvPr/>
         </p:nvPicPr>
         <p:blipFill>
           <a:blip r:embed="rId3"/>
@@ -6374,7 +6366,7 @@
         </p:blipFill>
         <p:spPr>
           <a:xfrm>
-            <a:off x="8126312" y="712421"/>
+            <a:off x="4186200" y="711521"/>
             <a:ext cx="3967200" cy="3254400"/>
           </a:xfrm>
           <a:prstGeom prst="rect">
@@ -6436,17 +6428,19 @@
       </p:cxnSp>
       <p:pic>
         <p:nvPicPr>
-          <p:cNvPr id="10" name="Picture 9">
-            <a:extLst>
-              <a:ext uri="{FF2B5EF4-FFF2-40B4-BE49-F238E27FC236}">
-                <a16:creationId xmlns:a16="http://schemas.microsoft.com/office/drawing/2014/main" id="{33700852-12E6-964C-9EC8-FF9AC580A367}"/>
+          <p:cNvPr id="8" name="Content Placeholder 7">
+            <a:extLst>
+              <a:ext uri="{FF2B5EF4-FFF2-40B4-BE49-F238E27FC236}">
+                <a16:creationId xmlns:a16="http://schemas.microsoft.com/office/drawing/2014/main" id="{4697CADC-9F9E-334E-9D5D-CF86649328E4}"/>
               </a:ext>
             </a:extLst>
           </p:cNvPr>
           <p:cNvPicPr>
-            <a:picLocks/>
+            <a:picLocks noGrp="1"/>
           </p:cNvPicPr>
-          <p:nvPr/>
+          <p:nvPr>
+            <p:ph sz="half" idx="2"/>
+          </p:nvPr>
         </p:nvPicPr>
         <p:blipFill>
           <a:blip r:embed="rId4"/>
@@ -6456,7 +6450,7 @@
         </p:blipFill>
         <p:spPr>
           <a:xfrm>
-            <a:off x="4112400" y="712421"/>
+            <a:off x="8273910" y="711521"/>
             <a:ext cx="3967200" cy="3254400"/>
           </a:xfrm>
           <a:prstGeom prst="rect">
@@ -6519,7 +6513,7 @@
     </p:spTree>
     <p:extLst>
       <p:ext uri="{BB962C8B-B14F-4D97-AF65-F5344CB8AC3E}">
-        <p14:creationId xmlns:p14="http://schemas.microsoft.com/office/powerpoint/2010/main" val="2107334995"/>
+        <p14:creationId xmlns:p14="http://schemas.microsoft.com/office/powerpoint/2010/main" val="2150736919"/>
       </p:ext>
     </p:extLst>
   </p:cSld>
@@ -6676,7 +6670,7 @@
           <p:cNvPr id="2" name="Title 1">
             <a:extLst>
               <a:ext uri="{FF2B5EF4-FFF2-40B4-BE49-F238E27FC236}">
-                <a16:creationId xmlns:a16="http://schemas.microsoft.com/office/drawing/2014/main" id="{9D5C906E-556D-A344-A0E9-A3B96E23ACC8}"/>
+                <a16:creationId xmlns:a16="http://schemas.microsoft.com/office/drawing/2014/main" id="{20FE96D7-A45D-9F4E-AA21-59DB87CDD280}"/>
               </a:ext>
             </a:extLst>
           </p:cNvPr>
@@ -6706,7 +6700,7 @@
                   <a:srgbClr val="FFFFFF"/>
                 </a:solidFill>
               </a:rPr>
-              <a:t>Second - </a:t>
+              <a:t>Third - </a:t>
             </a:r>
             <a:r>
               <a:rPr lang="en-GB" sz="5400" dirty="0">
@@ -6714,13 +6708,16 @@
                   <a:schemeClr val="bg1"/>
                 </a:solidFill>
               </a:rPr>
-              <a:t>7276ff002e0503c8</a:t>
-            </a:r>
-            <a:endParaRPr lang="en-US" sz="5400" dirty="0">
-              <a:solidFill>
-                <a:schemeClr val="bg1"/>
-              </a:solidFill>
-            </a:endParaRPr>
+              <a:t>1c497beffecab36d</a:t>
+            </a:r>
+            <a:r>
+              <a:rPr lang="en-US" sz="5400" dirty="0">
+                <a:solidFill>
+                  <a:srgbClr val="FFFFFF"/>
+                </a:solidFill>
+              </a:rPr>
+              <a:t> </a:t>
+            </a:r>
           </a:p>
         </p:txBody>
       </p:sp>
@@ -6729,7 +6726,7 @@
           <p:cNvPr id="10" name="Picture 9">
             <a:extLst>
               <a:ext uri="{FF2B5EF4-FFF2-40B4-BE49-F238E27FC236}">
-                <a16:creationId xmlns:a16="http://schemas.microsoft.com/office/drawing/2014/main" id="{9CF56AA6-42E2-694D-BDF2-01BE30F8BCAD}"/>
+                <a16:creationId xmlns:a16="http://schemas.microsoft.com/office/drawing/2014/main" id="{C36CABB9-CD2C-E244-98FD-846934F6C0B2}"/>
               </a:ext>
             </a:extLst>
           </p:cNvPr>
@@ -6746,7 +6743,7 @@
         </p:blipFill>
         <p:spPr>
           <a:xfrm>
-            <a:off x="4112400" y="679349"/>
+            <a:off x="4125945" y="640036"/>
             <a:ext cx="3967200" cy="3254400"/>
           </a:xfrm>
           <a:prstGeom prst="rect">
@@ -6756,10 +6753,10 @@
       </p:pic>
       <p:pic>
         <p:nvPicPr>
-          <p:cNvPr id="6" name="Content Placeholder 5">
-            <a:extLst>
-              <a:ext uri="{FF2B5EF4-FFF2-40B4-BE49-F238E27FC236}">
-                <a16:creationId xmlns:a16="http://schemas.microsoft.com/office/drawing/2014/main" id="{56D6F0B1-1F52-EC46-8646-5C0289770B4C}"/>
+          <p:cNvPr id="8" name="Content Placeholder 7">
+            <a:extLst>
+              <a:ext uri="{FF2B5EF4-FFF2-40B4-BE49-F238E27FC236}">
+                <a16:creationId xmlns:a16="http://schemas.microsoft.com/office/drawing/2014/main" id="{AF6CDFC5-F3F3-4444-BFBF-AA78496EF39B}"/>
               </a:ext>
             </a:extLst>
           </p:cNvPr>
@@ -6767,7 +6764,7 @@
             <a:picLocks noGrp="1"/>
           </p:cNvPicPr>
           <p:nvPr>
-            <p:ph sz="half" idx="1"/>
+            <p:ph sz="half" idx="2"/>
           </p:nvPr>
         </p:nvPicPr>
         <p:blipFill>
@@ -6778,7 +6775,7 @@
         </p:blipFill>
         <p:spPr>
           <a:xfrm>
-            <a:off x="0" y="679349"/>
+            <a:off x="8126312" y="640036"/>
             <a:ext cx="3967200" cy="3254400"/>
           </a:xfrm>
           <a:prstGeom prst="rect">
@@ -6840,10 +6837,10 @@
       </p:cxnSp>
       <p:pic>
         <p:nvPicPr>
-          <p:cNvPr id="8" name="Content Placeholder 7">
-            <a:extLst>
-              <a:ext uri="{FF2B5EF4-FFF2-40B4-BE49-F238E27FC236}">
-                <a16:creationId xmlns:a16="http://schemas.microsoft.com/office/drawing/2014/main" id="{94BB61BB-C6BF-FE43-BB8C-A35FF2DE2ED7}"/>
+          <p:cNvPr id="6" name="Content Placeholder 5">
+            <a:extLst>
+              <a:ext uri="{FF2B5EF4-FFF2-40B4-BE49-F238E27FC236}">
+                <a16:creationId xmlns:a16="http://schemas.microsoft.com/office/drawing/2014/main" id="{00FF11AF-7578-5943-A0C4-DD8EED19E0E2}"/>
               </a:ext>
             </a:extLst>
           </p:cNvPr>
@@ -6851,7 +6848,7 @@
             <a:picLocks noGrp="1"/>
           </p:cNvPicPr>
           <p:nvPr>
-            <p:ph sz="half" idx="2"/>
+            <p:ph sz="half" idx="1"/>
           </p:nvPr>
         </p:nvPicPr>
         <p:blipFill>
@@ -6862,7 +6859,7 @@
         </p:blipFill>
         <p:spPr>
           <a:xfrm>
-            <a:off x="8224800" y="679349"/>
+            <a:off x="-22021" y="640036"/>
             <a:ext cx="3967200" cy="3254400"/>
           </a:xfrm>
           <a:prstGeom prst="rect">
@@ -6925,7 +6922,7 @@
     </p:spTree>
     <p:extLst>
       <p:ext uri="{BB962C8B-B14F-4D97-AF65-F5344CB8AC3E}">
-        <p14:creationId xmlns:p14="http://schemas.microsoft.com/office/powerpoint/2010/main" val="3592700593"/>
+        <p14:creationId xmlns:p14="http://schemas.microsoft.com/office/powerpoint/2010/main" val="2897721853"/>
       </p:ext>
     </p:extLst>
   </p:cSld>
@@ -6936,6 +6933,123 @@
 </file>
 
 <file path=ppt/slides/slide8.xml><?xml version="1.0" encoding="utf-8"?>
+<p:sld xmlns:a="http://schemas.openxmlformats.org/drawingml/2006/main" xmlns:r="http://schemas.openxmlformats.org/officeDocument/2006/relationships" xmlns:p="http://schemas.openxmlformats.org/presentationml/2006/main">
+  <p:cSld>
+    <p:spTree>
+      <p:nvGrpSpPr>
+        <p:cNvPr id="1" name=""/>
+        <p:cNvGrpSpPr/>
+        <p:nvPr/>
+      </p:nvGrpSpPr>
+      <p:grpSpPr>
+        <a:xfrm>
+          <a:off x="0" y="0"/>
+          <a:ext cx="0" cy="0"/>
+          <a:chOff x="0" y="0"/>
+          <a:chExt cx="0" cy="0"/>
+        </a:xfrm>
+      </p:grpSpPr>
+      <p:sp>
+        <p:nvSpPr>
+          <p:cNvPr id="9" name="Title 8">
+            <a:extLst>
+              <a:ext uri="{FF2B5EF4-FFF2-40B4-BE49-F238E27FC236}">
+                <a16:creationId xmlns:a16="http://schemas.microsoft.com/office/drawing/2014/main" id="{8D138618-A67C-F548-B229-138222A2FC13}"/>
+              </a:ext>
+            </a:extLst>
+          </p:cNvPr>
+          <p:cNvSpPr>
+            <a:spLocks noGrp="1"/>
+          </p:cNvSpPr>
+          <p:nvPr>
+            <p:ph type="ctrTitle"/>
+          </p:nvPr>
+        </p:nvSpPr>
+        <p:spPr/>
+        <p:txBody>
+          <a:bodyPr/>
+          <a:lstStyle/>
+          <a:p>
+            <a:r>
+              <a:rPr lang="en-GB" dirty="0"/>
+              <a:t>Pre-deduplication device packets</a:t>
+            </a:r>
+          </a:p>
+        </p:txBody>
+      </p:sp>
+      <p:sp>
+        <p:nvSpPr>
+          <p:cNvPr id="10" name="Subtitle 9">
+            <a:extLst>
+              <a:ext uri="{FF2B5EF4-FFF2-40B4-BE49-F238E27FC236}">
+                <a16:creationId xmlns:a16="http://schemas.microsoft.com/office/drawing/2014/main" id="{DFE9E1B9-E1E2-F545-9D63-EFD7B621EE68}"/>
+              </a:ext>
+            </a:extLst>
+          </p:cNvPr>
+          <p:cNvSpPr>
+            <a:spLocks noGrp="1"/>
+          </p:cNvSpPr>
+          <p:nvPr>
+            <p:ph type="subTitle" idx="1"/>
+          </p:nvPr>
+        </p:nvSpPr>
+        <p:spPr/>
+        <p:txBody>
+          <a:bodyPr>
+            <a:normAutofit lnSpcReduction="10000"/>
+          </a:bodyPr>
+          <a:lstStyle/>
+          <a:p>
+            <a:pPr lvl="1" algn="l"/>
+            <a:r>
+              <a:rPr lang="en-GB" dirty="0"/>
+              <a:t>4 Gateways: </a:t>
+            </a:r>
+          </a:p>
+          <a:p>
+            <a:pPr lvl="1" algn="l"/>
+            <a:r>
+              <a:rPr lang="en-GB" dirty="0"/>
+              <a:t>Terni 	 	MAC: 70b3d54b13020000</a:t>
+            </a:r>
+          </a:p>
+          <a:p>
+            <a:pPr lvl="1" algn="l"/>
+            <a:r>
+              <a:rPr lang="en-GB" dirty="0"/>
+              <a:t>First 	 	MAC: 58a0cbeffe014e4c</a:t>
+            </a:r>
+          </a:p>
+          <a:p>
+            <a:pPr lvl="1" algn="l"/>
+            <a:r>
+              <a:rPr lang="en-GB" dirty="0"/>
+              <a:t>Second 		MAC: 7276ff002e0503c8</a:t>
+            </a:r>
+          </a:p>
+          <a:p>
+            <a:pPr lvl="1" algn="l"/>
+            <a:r>
+              <a:rPr lang="en-GB" dirty="0"/>
+              <a:t>Third 		MAC: 1c497beffecab36d</a:t>
+            </a:r>
+          </a:p>
+        </p:txBody>
+      </p:sp>
+    </p:spTree>
+    <p:extLst>
+      <p:ext uri="{BB962C8B-B14F-4D97-AF65-F5344CB8AC3E}">
+        <p14:creationId xmlns:p14="http://schemas.microsoft.com/office/powerpoint/2010/main" val="2486473387"/>
+      </p:ext>
+    </p:extLst>
+  </p:cSld>
+  <p:clrMapOvr>
+    <a:masterClrMapping/>
+  </p:clrMapOvr>
+</p:sld>
+</file>
+
+<file path=ppt/slides/slide9.xml><?xml version="1.0" encoding="utf-8"?>
 <p:sld xmlns:a="http://schemas.openxmlformats.org/drawingml/2006/main" xmlns:r="http://schemas.openxmlformats.org/officeDocument/2006/relationships" xmlns:p="http://schemas.openxmlformats.org/presentationml/2006/main">
   <p:cSld>
     <p:bg>
@@ -7082,7 +7196,7 @@
           <p:cNvPr id="2" name="Title 1">
             <a:extLst>
               <a:ext uri="{FF2B5EF4-FFF2-40B4-BE49-F238E27FC236}">
-                <a16:creationId xmlns:a16="http://schemas.microsoft.com/office/drawing/2014/main" id="{3EFE1A34-7DA6-1E4D-9562-1345FD695C00}"/>
+                <a16:creationId xmlns:a16="http://schemas.microsoft.com/office/drawing/2014/main" id="{EA70FF6C-8554-7D45-A218-F7F891B7BCC0}"/>
               </a:ext>
             </a:extLst>
           </p:cNvPr>
@@ -7112,7 +7226,7 @@
                   <a:srgbClr val="FFFFFF"/>
                 </a:solidFill>
               </a:rPr>
-              <a:t>Third - </a:t>
+              <a:t>Terni - </a:t>
             </a:r>
             <a:r>
               <a:rPr lang="en-GB" sz="5400" dirty="0">
@@ -7120,31 +7234,32 @@
                   <a:schemeClr val="bg1"/>
                 </a:solidFill>
               </a:rPr>
-              <a:t>1c497beffecab36d</a:t>
-            </a:r>
-            <a:endParaRPr lang="en-US" sz="5400" dirty="0">
-              <a:solidFill>
-                <a:schemeClr val="bg1"/>
-              </a:solidFill>
-            </a:endParaRPr>
+              <a:t>70b3d54b13020000</a:t>
+            </a:r>
+            <a:r>
+              <a:rPr lang="en-US" sz="5400" dirty="0">
+                <a:solidFill>
+                  <a:srgbClr val="FFFFFF"/>
+                </a:solidFill>
+              </a:rPr>
+              <a:t> </a:t>
+            </a:r>
           </a:p>
         </p:txBody>
       </p:sp>
       <p:pic>
         <p:nvPicPr>
-          <p:cNvPr id="6" name="Content Placeholder 5">
-            <a:extLst>
-              <a:ext uri="{FF2B5EF4-FFF2-40B4-BE49-F238E27FC236}">
-                <a16:creationId xmlns:a16="http://schemas.microsoft.com/office/drawing/2014/main" id="{E8BBE290-9EE2-4145-88DE-C67E1172D81F}"/>
+          <p:cNvPr id="10" name="Picture 9">
+            <a:extLst>
+              <a:ext uri="{FF2B5EF4-FFF2-40B4-BE49-F238E27FC236}">
+                <a16:creationId xmlns:a16="http://schemas.microsoft.com/office/drawing/2014/main" id="{69029E7B-4755-374D-83B8-BCE635536041}"/>
               </a:ext>
             </a:extLst>
           </p:cNvPr>
           <p:cNvPicPr>
-            <a:picLocks noGrp="1" noChangeAspect="1"/>
+            <a:picLocks/>
           </p:cNvPicPr>
-          <p:nvPr>
-            <p:ph sz="half" idx="1"/>
-          </p:nvPr>
+          <p:nvPr/>
         </p:nvPicPr>
         <p:blipFill>
           <a:blip r:embed="rId2"/>
@@ -7154,8 +7269,8 @@
         </p:blipFill>
         <p:spPr>
           <a:xfrm>
-            <a:off x="0" y="638827"/>
-            <a:ext cx="3965340" cy="3255608"/>
+            <a:off x="4186200" y="597254"/>
+            <a:ext cx="3967200" cy="3254400"/>
           </a:xfrm>
           <a:prstGeom prst="rect">
             <a:avLst/>
@@ -7164,17 +7279,19 @@
       </p:pic>
       <p:pic>
         <p:nvPicPr>
-          <p:cNvPr id="10" name="Picture 9">
-            <a:extLst>
-              <a:ext uri="{FF2B5EF4-FFF2-40B4-BE49-F238E27FC236}">
-                <a16:creationId xmlns:a16="http://schemas.microsoft.com/office/drawing/2014/main" id="{D249B997-3AEA-804E-9D50-83FC47B7F3FD}"/>
+          <p:cNvPr id="8" name="Content Placeholder 7">
+            <a:extLst>
+              <a:ext uri="{FF2B5EF4-FFF2-40B4-BE49-F238E27FC236}">
+                <a16:creationId xmlns:a16="http://schemas.microsoft.com/office/drawing/2014/main" id="{B3B4023A-C3DF-3248-AA8A-5684E2033707}"/>
               </a:ext>
             </a:extLst>
           </p:cNvPr>
           <p:cNvPicPr>
-            <a:picLocks noChangeAspect="1"/>
+            <a:picLocks noGrp="1"/>
           </p:cNvPicPr>
-          <p:nvPr/>
+          <p:nvPr>
+            <p:ph sz="half" idx="2"/>
+          </p:nvPr>
         </p:nvPicPr>
         <p:blipFill>
           <a:blip r:embed="rId3"/>
@@ -7184,8 +7301,8 @@
         </p:blipFill>
         <p:spPr>
           <a:xfrm>
-            <a:off x="4112400" y="638827"/>
-            <a:ext cx="3967200" cy="3255608"/>
+            <a:off x="8126312" y="597254"/>
+            <a:ext cx="3967200" cy="3254400"/>
           </a:xfrm>
           <a:prstGeom prst="rect">
             <a:avLst/>
@@ -7246,18 +7363,18 @@
       </p:cxnSp>
       <p:pic>
         <p:nvPicPr>
-          <p:cNvPr id="8" name="Content Placeholder 7">
-            <a:extLst>
-              <a:ext uri="{FF2B5EF4-FFF2-40B4-BE49-F238E27FC236}">
-                <a16:creationId xmlns:a16="http://schemas.microsoft.com/office/drawing/2014/main" id="{D9C8548B-1D71-1147-9379-FF4F6C2F10B4}"/>
+          <p:cNvPr id="6" name="Content Placeholder 5">
+            <a:extLst>
+              <a:ext uri="{FF2B5EF4-FFF2-40B4-BE49-F238E27FC236}">
+                <a16:creationId xmlns:a16="http://schemas.microsoft.com/office/drawing/2014/main" id="{1F85DC14-935C-F84D-882A-E39CDFF634A2}"/>
               </a:ext>
             </a:extLst>
           </p:cNvPr>
           <p:cNvPicPr>
-            <a:picLocks noGrp="1" noChangeAspect="1"/>
+            <a:picLocks noGrp="1"/>
           </p:cNvPicPr>
           <p:nvPr>
-            <p:ph sz="half" idx="2"/>
+            <p:ph sz="half" idx="1"/>
           </p:nvPr>
         </p:nvPicPr>
         <p:blipFill>
@@ -7268,8 +7385,8 @@
         </p:blipFill>
         <p:spPr>
           <a:xfrm>
-            <a:off x="8227201" y="639230"/>
-            <a:ext cx="3964801" cy="3255205"/>
+            <a:off x="38234" y="597703"/>
+            <a:ext cx="3967200" cy="3254400"/>
           </a:xfrm>
           <a:prstGeom prst="rect">
             <a:avLst/>
@@ -7331,124 +7448,7 @@
     </p:spTree>
     <p:extLst>
       <p:ext uri="{BB962C8B-B14F-4D97-AF65-F5344CB8AC3E}">
-        <p14:creationId xmlns:p14="http://schemas.microsoft.com/office/powerpoint/2010/main" val="2977146383"/>
-      </p:ext>
-    </p:extLst>
-  </p:cSld>
-  <p:clrMapOvr>
-    <a:masterClrMapping/>
-  </p:clrMapOvr>
-</p:sld>
-</file>
-
-<file path=ppt/slides/slide9.xml><?xml version="1.0" encoding="utf-8"?>
-<p:sld xmlns:a="http://schemas.openxmlformats.org/drawingml/2006/main" xmlns:r="http://schemas.openxmlformats.org/officeDocument/2006/relationships" xmlns:p="http://schemas.openxmlformats.org/presentationml/2006/main">
-  <p:cSld>
-    <p:spTree>
-      <p:nvGrpSpPr>
-        <p:cNvPr id="1" name=""/>
-        <p:cNvGrpSpPr/>
-        <p:nvPr/>
-      </p:nvGrpSpPr>
-      <p:grpSpPr>
-        <a:xfrm>
-          <a:off x="0" y="0"/>
-          <a:ext cx="0" cy="0"/>
-          <a:chOff x="0" y="0"/>
-          <a:chExt cx="0" cy="0"/>
-        </a:xfrm>
-      </p:grpSpPr>
-      <p:sp>
-        <p:nvSpPr>
-          <p:cNvPr id="9" name="Title 8">
-            <a:extLst>
-              <a:ext uri="{FF2B5EF4-FFF2-40B4-BE49-F238E27FC236}">
-                <a16:creationId xmlns:a16="http://schemas.microsoft.com/office/drawing/2014/main" id="{8D138618-A67C-F548-B229-138222A2FC13}"/>
-              </a:ext>
-            </a:extLst>
-          </p:cNvPr>
-          <p:cNvSpPr>
-            <a:spLocks noGrp="1"/>
-          </p:cNvSpPr>
-          <p:nvPr>
-            <p:ph type="ctrTitle"/>
-          </p:nvPr>
-        </p:nvSpPr>
-        <p:spPr/>
-        <p:txBody>
-          <a:bodyPr/>
-          <a:lstStyle/>
-          <a:p>
-            <a:r>
-              <a:rPr lang="en-GB" dirty="0"/>
-              <a:t>Deduplication device packets</a:t>
-            </a:r>
-          </a:p>
-        </p:txBody>
-      </p:sp>
-      <p:sp>
-        <p:nvSpPr>
-          <p:cNvPr id="10" name="Subtitle 9">
-            <a:extLst>
-              <a:ext uri="{FF2B5EF4-FFF2-40B4-BE49-F238E27FC236}">
-                <a16:creationId xmlns:a16="http://schemas.microsoft.com/office/drawing/2014/main" id="{DFE9E1B9-E1E2-F545-9D63-EFD7B621EE68}"/>
-              </a:ext>
-            </a:extLst>
-          </p:cNvPr>
-          <p:cNvSpPr>
-            <a:spLocks noGrp="1"/>
-          </p:cNvSpPr>
-          <p:nvPr>
-            <p:ph type="subTitle" idx="1"/>
-          </p:nvPr>
-        </p:nvSpPr>
-        <p:spPr/>
-        <p:txBody>
-          <a:bodyPr>
-            <a:normAutofit/>
-          </a:bodyPr>
-          <a:lstStyle/>
-          <a:p>
-            <a:pPr lvl="1" algn="l"/>
-            <a:r>
-              <a:rPr lang="en-GB" dirty="0"/>
-              <a:t>3 Gateways: </a:t>
-            </a:r>
-          </a:p>
-          <a:p>
-            <a:pPr lvl="1" algn="l"/>
-            <a:r>
-              <a:rPr lang="en-GB" dirty="0"/>
-              <a:t>First 	 	MAC: 58a0cbeffe014e4c</a:t>
-            </a:r>
-          </a:p>
-          <a:p>
-            <a:pPr lvl="1" algn="l"/>
-            <a:r>
-              <a:rPr lang="en-GB" dirty="0"/>
-              <a:t>Second 		MAC: 7276ff002e0503c8</a:t>
-            </a:r>
-          </a:p>
-          <a:p>
-            <a:pPr lvl="1" algn="l"/>
-            <a:r>
-              <a:rPr lang="en-GB" dirty="0"/>
-              <a:t>Third 		MAC: 1c497beffecab36d</a:t>
-            </a:r>
-          </a:p>
-          <a:p>
-            <a:pPr algn="l"/>
-            <a:endParaRPr lang="en-GB" dirty="0"/>
-          </a:p>
-          <a:p>
-            <a:endParaRPr lang="en-GB" dirty="0"/>
-          </a:p>
-        </p:txBody>
-      </p:sp>
-    </p:spTree>
-    <p:extLst>
-      <p:ext uri="{BB962C8B-B14F-4D97-AF65-F5344CB8AC3E}">
-        <p14:creationId xmlns:p14="http://schemas.microsoft.com/office/powerpoint/2010/main" val="2137356216"/>
+        <p14:creationId xmlns:p14="http://schemas.microsoft.com/office/powerpoint/2010/main" val="2673612195"/>
       </p:ext>
     </p:extLst>
   </p:cSld>

</xml_diff>